<commit_message>
Actualizando Seccion 7 Diapos
</commit_message>
<xml_diff>
--- a/Seccion 7 Escalado Multidimensional/Diapositivas/7.2 Escalado métrico o coordenadas principales.pptx
+++ b/Seccion 7 Escalado Multidimensional/Diapositivas/7.2 Escalado métrico o coordenadas principales.pptx
@@ -12232,7 +12232,7 @@
             <a:fld id="{B61BEF0D-F0BB-DE4B-95CE-6DB70DBA9567}" type="datetimeFigureOut">
               <a:rPr lang="en-US" smtClean="0"/>
               <a:pPr/>
-              <a:t>1/21/2020</a:t>
+              <a:t>4/8/2020</a:t>
             </a:fld>
             <a:endParaRPr lang="en-US" dirty="0"/>
           </a:p>
@@ -12431,7 +12431,7 @@
           <a:p>
             <a:fld id="{55C6B4A9-1611-4792-9094-5F34BCA07E0B}" type="datetimeFigureOut">
               <a:rPr lang="en-US" smtClean="0"/>
-              <a:t>1/21/2020</a:t>
+              <a:t>4/8/2020</a:t>
             </a:fld>
             <a:endParaRPr lang="en-US" dirty="0"/>
           </a:p>
@@ -12640,7 +12640,7 @@
             <a:fld id="{B61BEF0D-F0BB-DE4B-95CE-6DB70DBA9567}" type="datetimeFigureOut">
               <a:rPr lang="en-US" smtClean="0"/>
               <a:pPr/>
-              <a:t>1/21/2020</a:t>
+              <a:t>4/8/2020</a:t>
             </a:fld>
             <a:endParaRPr lang="en-US" dirty="0"/>
           </a:p>
@@ -13460,7 +13460,7 @@
             <a:fld id="{B61BEF0D-F0BB-DE4B-95CE-6DB70DBA9567}" type="datetimeFigureOut">
               <a:rPr lang="en-US" smtClean="0"/>
               <a:pPr/>
-              <a:t>1/21/2020</a:t>
+              <a:t>4/8/2020</a:t>
             </a:fld>
             <a:endParaRPr lang="en-US" dirty="0"/>
           </a:p>
@@ -13632,7 +13632,7 @@
             <a:fld id="{B61BEF0D-F0BB-DE4B-95CE-6DB70DBA9567}" type="datetimeFigureOut">
               <a:rPr lang="en-US" smtClean="0"/>
               <a:pPr/>
-              <a:t>1/21/2020</a:t>
+              <a:t>4/8/2020</a:t>
             </a:fld>
             <a:endParaRPr lang="en-US" dirty="0"/>
           </a:p>
@@ -13881,7 +13881,7 @@
             <a:fld id="{B61BEF0D-F0BB-DE4B-95CE-6DB70DBA9567}" type="datetimeFigureOut">
               <a:rPr lang="en-US" smtClean="0"/>
               <a:pPr/>
-              <a:t>1/21/2020</a:t>
+              <a:t>4/8/2020</a:t>
             </a:fld>
             <a:endParaRPr lang="en-US" dirty="0"/>
           </a:p>
@@ -14114,7 +14114,7 @@
           <a:p>
             <a:fld id="{EB712588-04B1-427B-82EE-E8DB90309F08}" type="datetimeFigureOut">
               <a:rPr lang="en-US" smtClean="0"/>
-              <a:t>1/21/2020</a:t>
+              <a:t>4/8/2020</a:t>
             </a:fld>
             <a:endParaRPr lang="en-US" dirty="0"/>
           </a:p>
@@ -14489,7 +14489,7 @@
             <a:fld id="{B61BEF0D-F0BB-DE4B-95CE-6DB70DBA9567}" type="datetimeFigureOut">
               <a:rPr lang="en-US" smtClean="0"/>
               <a:pPr/>
-              <a:t>1/21/2020</a:t>
+              <a:t>4/8/2020</a:t>
             </a:fld>
             <a:endParaRPr lang="en-US" dirty="0"/>
           </a:p>
@@ -14614,7 +14614,7 @@
             <a:fld id="{B61BEF0D-F0BB-DE4B-95CE-6DB70DBA9567}" type="datetimeFigureOut">
               <a:rPr lang="en-US" smtClean="0"/>
               <a:pPr/>
-              <a:t>1/21/2020</a:t>
+              <a:t>4/8/2020</a:t>
             </a:fld>
             <a:endParaRPr lang="en-US" dirty="0"/>
           </a:p>
@@ -14711,7 +14711,7 @@
             <a:fld id="{B61BEF0D-F0BB-DE4B-95CE-6DB70DBA9567}" type="datetimeFigureOut">
               <a:rPr lang="en-US" smtClean="0"/>
               <a:pPr/>
-              <a:t>1/21/2020</a:t>
+              <a:t>4/8/2020</a:t>
             </a:fld>
             <a:endParaRPr lang="en-US" dirty="0"/>
           </a:p>
@@ -14967,7 +14967,7 @@
           <a:p>
             <a:fld id="{42A54C80-263E-416B-A8E0-580EDEADCBDC}" type="datetimeFigureOut">
               <a:rPr lang="en-US" smtClean="0"/>
-              <a:t>1/21/2020</a:t>
+              <a:t>4/8/2020</a:t>
             </a:fld>
             <a:endParaRPr lang="en-US" dirty="0"/>
           </a:p>
@@ -15154,7 +15154,7 @@
             <a:fld id="{B61BEF0D-F0BB-DE4B-95CE-6DB70DBA9567}" type="datetimeFigureOut">
               <a:rPr lang="en-US" smtClean="0"/>
               <a:pPr/>
-              <a:t>1/21/2020</a:t>
+              <a:t>4/8/2020</a:t>
             </a:fld>
             <a:endParaRPr lang="en-US" dirty="0"/>
           </a:p>
@@ -15474,7 +15474,7 @@
             <a:fld id="{B61BEF0D-F0BB-DE4B-95CE-6DB70DBA9567}" type="datetimeFigureOut">
               <a:rPr lang="en-US" smtClean="0"/>
               <a:pPr/>
-              <a:t>1/21/2020</a:t>
+              <a:t>4/8/2020</a:t>
             </a:fld>
             <a:endParaRPr lang="en-US" dirty="0"/>
           </a:p>
@@ -15684,7 +15684,7 @@
             <a:fld id="{B61BEF0D-F0BB-DE4B-95CE-6DB70DBA9567}" type="datetimeFigureOut">
               <a:rPr lang="en-US" smtClean="0"/>
               <a:pPr/>
-              <a:t>1/21/2020</a:t>
+              <a:t>4/8/2020</a:t>
             </a:fld>
             <a:endParaRPr lang="en-US" dirty="0"/>
           </a:p>
@@ -16000,7 +16000,7 @@
             <a:fld id="{B61BEF0D-F0BB-DE4B-95CE-6DB70DBA9567}" type="datetimeFigureOut">
               <a:rPr lang="en-US" smtClean="0"/>
               <a:pPr/>
-              <a:t>1/21/2020</a:t>
+              <a:t>4/8/2020</a:t>
             </a:fld>
             <a:endParaRPr lang="en-US" dirty="0"/>
           </a:p>
@@ -16335,7 +16335,7 @@
             <a:fld id="{B61BEF0D-F0BB-DE4B-95CE-6DB70DBA9567}" type="datetimeFigureOut">
               <a:rPr lang="en-US" smtClean="0"/>
               <a:pPr/>
-              <a:t>1/21/2020</a:t>
+              <a:t>4/8/2020</a:t>
             </a:fld>
             <a:endParaRPr lang="en-US" dirty="0"/>
           </a:p>
@@ -16651,7 +16651,7 @@
             <a:fld id="{B61BEF0D-F0BB-DE4B-95CE-6DB70DBA9567}" type="datetimeFigureOut">
               <a:rPr lang="en-US" smtClean="0"/>
               <a:pPr/>
-              <a:t>1/21/2020</a:t>
+              <a:t>4/8/2020</a:t>
             </a:fld>
             <a:endParaRPr lang="en-US" dirty="0"/>
           </a:p>
@@ -17046,7 +17046,7 @@
             <a:fld id="{B61BEF0D-F0BB-DE4B-95CE-6DB70DBA9567}" type="datetimeFigureOut">
               <a:rPr lang="en-US" smtClean="0"/>
               <a:pPr/>
-              <a:t>1/21/2020</a:t>
+              <a:t>4/8/2020</a:t>
             </a:fld>
             <a:endParaRPr lang="en-US" dirty="0"/>
           </a:p>
@@ -17217,7 +17217,7 @@
           <a:p>
             <a:fld id="{55C6B4A9-1611-4792-9094-5F34BCA07E0B}" type="datetimeFigureOut">
               <a:rPr lang="en-US" smtClean="0"/>
-              <a:t>1/21/2020</a:t>
+              <a:t>4/8/2020</a:t>
             </a:fld>
             <a:endParaRPr lang="en-US" dirty="0"/>
           </a:p>
@@ -17398,7 +17398,7 @@
             <a:fld id="{B61BEF0D-F0BB-DE4B-95CE-6DB70DBA9567}" type="datetimeFigureOut">
               <a:rPr lang="en-US" smtClean="0"/>
               <a:pPr/>
-              <a:t>1/21/2020</a:t>
+              <a:t>4/8/2020</a:t>
             </a:fld>
             <a:endParaRPr lang="en-US" dirty="0"/>
           </a:p>
@@ -17663,7 +17663,7 @@
             <a:fld id="{B61BEF0D-F0BB-DE4B-95CE-6DB70DBA9567}" type="datetimeFigureOut">
               <a:rPr lang="en-US" smtClean="0"/>
               <a:pPr/>
-              <a:t>1/21/2020</a:t>
+              <a:t>4/8/2020</a:t>
             </a:fld>
             <a:endParaRPr lang="en-US" dirty="0"/>
           </a:p>
@@ -17929,7 +17929,7 @@
           <a:p>
             <a:fld id="{EB712588-04B1-427B-82EE-E8DB90309F08}" type="datetimeFigureOut">
               <a:rPr lang="en-US" smtClean="0"/>
-              <a:t>1/21/2020</a:t>
+              <a:t>4/8/2020</a:t>
             </a:fld>
             <a:endParaRPr lang="en-US" dirty="0"/>
           </a:p>
@@ -18342,7 +18342,7 @@
             <a:fld id="{B61BEF0D-F0BB-DE4B-95CE-6DB70DBA9567}" type="datetimeFigureOut">
               <a:rPr lang="en-US" smtClean="0"/>
               <a:pPr/>
-              <a:t>1/21/2020</a:t>
+              <a:t>4/8/2020</a:t>
             </a:fld>
             <a:endParaRPr lang="en-US" dirty="0"/>
           </a:p>
@@ -18485,7 +18485,7 @@
             <a:fld id="{B61BEF0D-F0BB-DE4B-95CE-6DB70DBA9567}" type="datetimeFigureOut">
               <a:rPr lang="en-US" smtClean="0"/>
               <a:pPr/>
-              <a:t>1/21/2020</a:t>
+              <a:t>4/8/2020</a:t>
             </a:fld>
             <a:endParaRPr lang="en-US" dirty="0"/>
           </a:p>
@@ -18600,7 +18600,7 @@
             <a:fld id="{B61BEF0D-F0BB-DE4B-95CE-6DB70DBA9567}" type="datetimeFigureOut">
               <a:rPr lang="en-US" smtClean="0"/>
               <a:pPr/>
-              <a:t>1/21/2020</a:t>
+              <a:t>4/8/2020</a:t>
             </a:fld>
             <a:endParaRPr lang="en-US" dirty="0"/>
           </a:p>
@@ -18912,7 +18912,7 @@
           <a:p>
             <a:fld id="{42A54C80-263E-416B-A8E0-580EDEADCBDC}" type="datetimeFigureOut">
               <a:rPr lang="en-US" smtClean="0"/>
-              <a:t>1/21/2020</a:t>
+              <a:t>4/8/2020</a:t>
             </a:fld>
             <a:endParaRPr lang="en-US" dirty="0"/>
           </a:p>
@@ -19201,7 +19201,7 @@
             <a:fld id="{B61BEF0D-F0BB-DE4B-95CE-6DB70DBA9567}" type="datetimeFigureOut">
               <a:rPr lang="en-US" smtClean="0"/>
               <a:pPr/>
-              <a:t>1/21/2020</a:t>
+              <a:t>4/8/2020</a:t>
             </a:fld>
             <a:endParaRPr lang="en-US" dirty="0"/>
           </a:p>
@@ -19444,7 +19444,7 @@
             <a:fld id="{B61BEF0D-F0BB-DE4B-95CE-6DB70DBA9567}" type="datetimeFigureOut">
               <a:rPr lang="en-US" smtClean="0"/>
               <a:pPr/>
-              <a:t>1/21/2020</a:t>
+              <a:t>4/8/2020</a:t>
             </a:fld>
             <a:endParaRPr lang="en-US" dirty="0"/>
           </a:p>
@@ -20529,7 +20529,7 @@
             <a:fld id="{B61BEF0D-F0BB-DE4B-95CE-6DB70DBA9567}" type="datetimeFigureOut">
               <a:rPr lang="en-US" smtClean="0"/>
               <a:pPr/>
-              <a:t>1/21/2020</a:t>
+              <a:t>4/8/2020</a:t>
             </a:fld>
             <a:endParaRPr lang="en-US" dirty="0"/>
           </a:p>
@@ -27444,8 +27444,8 @@
           </p:sp>
         </mc:Fallback>
       </mc:AlternateContent>
-      <mc:AlternateContent xmlns:mc="http://schemas.openxmlformats.org/markup-compatibility/2006" xmlns:a14="http://schemas.microsoft.com/office/drawing/2010/main">
-        <mc:Choice Requires="a14">
+      <mc:AlternateContent xmlns:mc="http://schemas.openxmlformats.org/markup-compatibility/2006">
+        <mc:Choice xmlns:a14="http://schemas.microsoft.com/office/drawing/2010/main" Requires="a14">
           <p:sp>
             <p:nvSpPr>
               <p:cNvPr id="3" name="Marcador de contenido 2">
@@ -27464,7 +27464,7 @@
             </p:nvSpPr>
             <p:spPr>
               <a:xfrm>
-                <a:off x="276280" y="1519989"/>
+                <a:off x="267402" y="1519989"/>
                 <a:ext cx="9124394" cy="5089358"/>
               </a:xfrm>
             </p:spPr>
@@ -27589,40 +27589,6 @@
                         </a:rPr>
                         <m:t>=</m:t>
                       </m:r>
-                      <m:f>
-                        <m:fPr>
-                          <m:ctrlPr>
-                            <a:rPr lang="es-ES" sz="2000" i="1" smtClean="0">
-                              <a:solidFill>
-                                <a:schemeClr val="bg1"/>
-                              </a:solidFill>
-                              <a:latin typeface="Cambria Math" panose="02040503050406030204" pitchFamily="18" charset="0"/>
-                            </a:rPr>
-                          </m:ctrlPr>
-                        </m:fPr>
-                        <m:num>
-                          <m:r>
-                            <a:rPr lang="es-ES" sz="2000" i="1">
-                              <a:solidFill>
-                                <a:schemeClr val="bg1"/>
-                              </a:solidFill>
-                              <a:latin typeface="Cambria Math" panose="02040503050406030204" pitchFamily="18" charset="0"/>
-                            </a:rPr>
-                            <m:t>1</m:t>
-                          </m:r>
-                        </m:num>
-                        <m:den>
-                          <m:r>
-                            <a:rPr lang="es-ES" sz="2000" i="1">
-                              <a:solidFill>
-                                <a:schemeClr val="bg1"/>
-                              </a:solidFill>
-                              <a:latin typeface="Cambria Math" panose="02040503050406030204" pitchFamily="18" charset="0"/>
-                            </a:rPr>
-                            <m:t>𝑛</m:t>
-                          </m:r>
-                        </m:den>
-                      </m:f>
                       <m:sSubSup>
                         <m:sSubSupPr>
                           <m:ctrlPr>
@@ -27686,40 +27652,6 @@
                         </a:rPr>
                         <m:t>+</m:t>
                       </m:r>
-                      <m:f>
-                        <m:fPr>
-                          <m:ctrlPr>
-                            <a:rPr lang="es-ES" sz="2000" i="1">
-                              <a:solidFill>
-                                <a:schemeClr val="bg1"/>
-                              </a:solidFill>
-                              <a:latin typeface="Cambria Math" panose="02040503050406030204" pitchFamily="18" charset="0"/>
-                            </a:rPr>
-                          </m:ctrlPr>
-                        </m:fPr>
-                        <m:num>
-                          <m:r>
-                            <a:rPr lang="es-ES" sz="2000" i="1">
-                              <a:solidFill>
-                                <a:schemeClr val="bg1"/>
-                              </a:solidFill>
-                              <a:latin typeface="Cambria Math" panose="02040503050406030204" pitchFamily="18" charset="0"/>
-                            </a:rPr>
-                            <m:t>1</m:t>
-                          </m:r>
-                        </m:num>
-                        <m:den>
-                          <m:r>
-                            <a:rPr lang="es-ES" sz="2000" i="1">
-                              <a:solidFill>
-                                <a:schemeClr val="bg1"/>
-                              </a:solidFill>
-                              <a:latin typeface="Cambria Math" panose="02040503050406030204" pitchFamily="18" charset="0"/>
-                            </a:rPr>
-                            <m:t>𝑛</m:t>
-                          </m:r>
-                        </m:den>
-                      </m:f>
                       <m:sSubSup>
                         <m:sSubSupPr>
                           <m:ctrlPr>
@@ -28510,7 +28442,7 @@
             </p:txBody>
           </p:sp>
         </mc:Choice>
-        <mc:Fallback xmlns="">
+        <mc:Fallback>
           <p:sp>
             <p:nvSpPr>
               <p:cNvPr id="3" name="Marcador de contenido 2">
@@ -28529,13 +28461,13 @@
             </p:nvSpPr>
             <p:spPr>
               <a:xfrm>
-                <a:off x="276280" y="1519989"/>
+                <a:off x="267402" y="1519989"/>
                 <a:ext cx="9124394" cy="5089358"/>
               </a:xfrm>
               <a:blipFill>
                 <a:blip r:embed="rId3"/>
                 <a:stretch>
-                  <a:fillRect l="-267" t="-599"/>
+                  <a:fillRect l="-334" t="-599"/>
                 </a:stretch>
               </a:blipFill>
             </p:spPr>
@@ -28690,8 +28622,8 @@
           <a:chExt cx="0" cy="0"/>
         </a:xfrm>
       </p:grpSpPr>
-      <mc:AlternateContent xmlns:mc="http://schemas.openxmlformats.org/markup-compatibility/2006">
-        <mc:Choice xmlns:a14="http://schemas.microsoft.com/office/drawing/2010/main" Requires="a14">
+      <mc:AlternateContent xmlns:mc="http://schemas.openxmlformats.org/markup-compatibility/2006" xmlns:a14="http://schemas.microsoft.com/office/drawing/2010/main">
+        <mc:Choice Requires="a14">
           <p:sp>
             <p:nvSpPr>
               <p:cNvPr id="2" name="Título 1">
@@ -28755,7 +28687,7 @@
             </p:txBody>
           </p:sp>
         </mc:Choice>
-        <mc:Fallback>
+        <mc:Fallback xmlns="">
           <p:sp>
             <p:nvSpPr>
               <p:cNvPr id="2" name="Título 1">
@@ -28795,8 +28727,8 @@
           </p:sp>
         </mc:Fallback>
       </mc:AlternateContent>
-      <mc:AlternateContent xmlns:mc="http://schemas.openxmlformats.org/markup-compatibility/2006">
-        <mc:Choice xmlns:a14="http://schemas.microsoft.com/office/drawing/2010/main" Requires="a14">
+      <mc:AlternateContent xmlns:mc="http://schemas.openxmlformats.org/markup-compatibility/2006" xmlns:a14="http://schemas.microsoft.com/office/drawing/2010/main">
+        <mc:Choice Requires="a14">
           <p:sp>
             <p:nvSpPr>
               <p:cNvPr id="3" name="Marcador de contenido 2">
@@ -29719,7 +29651,7 @@
             </p:txBody>
           </p:sp>
         </mc:Choice>
-        <mc:Fallback>
+        <mc:Fallback xmlns="">
           <p:sp>
             <p:nvSpPr>
               <p:cNvPr id="3" name="Marcador de contenido 2">

</xml_diff>